<commit_message>
feat: add works and third course test scripts.
</commit_message>
<xml_diff>
--- a/course/work/20250130_第一次作业 v2.0.pptx
+++ b/course/work/20250130_第一次作业 v2.0.pptx
@@ -5,7 +5,7 @@
     <p:sldMasterId id="2147483648" r:id="rId1"/>
   </p:sldMasterIdLst>
   <p:notesMasterIdLst>
-    <p:notesMasterId r:id="rId15"/>
+    <p:notesMasterId r:id="rId16"/>
   </p:notesMasterIdLst>
   <p:sldIdLst>
     <p:sldId id="256" r:id="rId2"/>
@@ -19,8 +19,9 @@
     <p:sldId id="399" r:id="rId10"/>
     <p:sldId id="402" r:id="rId11"/>
     <p:sldId id="401" r:id="rId12"/>
-    <p:sldId id="261" r:id="rId13"/>
-    <p:sldId id="260" r:id="rId14"/>
+    <p:sldId id="403" r:id="rId13"/>
+    <p:sldId id="261" r:id="rId14"/>
+    <p:sldId id="260" r:id="rId15"/>
   </p:sldIdLst>
   <p:sldSz cx="9144000" cy="5143500" type="screen16x9"/>
   <p:notesSz cx="7104063" cy="10234613"/>
@@ -147,6 +148,7 @@
             <p14:sldId id="399"/>
             <p14:sldId id="402"/>
             <p14:sldId id="401"/>
+            <p14:sldId id="403"/>
           </p14:sldIdLst>
         </p14:section>
         <p14:section name="QA" id="{D9F77B5A-46C7-4EC7-941D-E23A4BE65AA4}">
@@ -744,6 +746,96 @@
             <p:ph type="sldImg"/>
           </p:nvPr>
         </p:nvSpPr>
+        <p:spPr>
+          <a:xfrm>
+            <a:off x="482600" y="1279525"/>
+            <a:ext cx="6138863" cy="3454400"/>
+          </a:xfrm>
+        </p:spPr>
+      </p:sp>
+      <p:sp>
+        <p:nvSpPr>
+          <p:cNvPr id="3" name="备注占位符 2"/>
+          <p:cNvSpPr>
+            <a:spLocks noGrp="1"/>
+          </p:cNvSpPr>
+          <p:nvPr>
+            <p:ph type="body" idx="1"/>
+          </p:nvPr>
+        </p:nvSpPr>
+        <p:spPr/>
+        <p:txBody>
+          <a:bodyPr/>
+          <a:lstStyle/>
+          <a:p>
+            <a:endParaRPr lang="zh-CN" altLang="en-US" dirty="0"/>
+          </a:p>
+        </p:txBody>
+      </p:sp>
+      <p:sp>
+        <p:nvSpPr>
+          <p:cNvPr id="4" name="灯片编号占位符 3"/>
+          <p:cNvSpPr>
+            <a:spLocks noGrp="1"/>
+          </p:cNvSpPr>
+          <p:nvPr>
+            <p:ph type="sldNum" sz="quarter" idx="5"/>
+          </p:nvPr>
+        </p:nvSpPr>
+        <p:spPr/>
+        <p:txBody>
+          <a:bodyPr/>
+          <a:lstStyle/>
+          <a:p>
+            <a:fld id="{A6837353-30EB-4A48-80EB-173D804AEFBD}" type="slidenum">
+              <a:rPr lang="zh-CN" altLang="en-US" smtClean="0"/>
+              <a:pPr/>
+              <a:t>12</a:t>
+            </a:fld>
+            <a:endParaRPr lang="zh-CN" altLang="en-US"/>
+          </a:p>
+        </p:txBody>
+      </p:sp>
+    </p:spTree>
+    <p:extLst>
+      <p:ext uri="{BB962C8B-B14F-4D97-AF65-F5344CB8AC3E}">
+        <p14:creationId xmlns:p14="http://schemas.microsoft.com/office/powerpoint/2010/main" val="2909292752"/>
+      </p:ext>
+    </p:extLst>
+  </p:cSld>
+  <p:clrMapOvr>
+    <a:masterClrMapping/>
+  </p:clrMapOvr>
+</p:notes>
+</file>
+
+<file path=ppt/notesSlides/notesSlide12.xml><?xml version="1.0" encoding="utf-8"?>
+<p:notes xmlns:a="http://schemas.openxmlformats.org/drawingml/2006/main" xmlns:r="http://schemas.openxmlformats.org/officeDocument/2006/relationships" xmlns:p="http://schemas.openxmlformats.org/presentationml/2006/main">
+  <p:cSld>
+    <p:spTree>
+      <p:nvGrpSpPr>
+        <p:cNvPr id="1" name=""/>
+        <p:cNvGrpSpPr/>
+        <p:nvPr/>
+      </p:nvGrpSpPr>
+      <p:grpSpPr>
+        <a:xfrm>
+          <a:off x="0" y="0"/>
+          <a:ext cx="0" cy="0"/>
+          <a:chOff x="0" y="0"/>
+          <a:chExt cx="0" cy="0"/>
+        </a:xfrm>
+      </p:grpSpPr>
+      <p:sp>
+        <p:nvSpPr>
+          <p:cNvPr id="2" name="幻灯片图像占位符 1"/>
+          <p:cNvSpPr>
+            <a:spLocks noGrp="1" noRot="1" noChangeAspect="1"/>
+          </p:cNvSpPr>
+          <p:nvPr>
+            <p:ph type="sldImg"/>
+          </p:nvPr>
+        </p:nvSpPr>
         <p:spPr/>
       </p:sp>
       <p:sp>
@@ -783,7 +875,7 @@
             <a:fld id="{A6837353-30EB-4A48-80EB-173D804AEFBD}" type="slidenum">
               <a:rPr lang="zh-CN" altLang="en-US" smtClean="0"/>
               <a:pPr/>
-              <a:t>13</a:t>
+              <a:t>14</a:t>
             </a:fld>
             <a:endParaRPr lang="zh-CN" altLang="en-US"/>
           </a:p>
@@ -6978,6 +7070,1011 @@
 <file path=ppt/slides/slide12.xml><?xml version="1.0" encoding="utf-8"?>
 <p:sld xmlns:a="http://schemas.openxmlformats.org/drawingml/2006/main" xmlns:r="http://schemas.openxmlformats.org/officeDocument/2006/relationships" xmlns:p="http://schemas.openxmlformats.org/presentationml/2006/main">
   <p:cSld>
+    <p:spTree>
+      <p:nvGrpSpPr>
+        <p:cNvPr id="1" name=""/>
+        <p:cNvGrpSpPr/>
+        <p:nvPr/>
+      </p:nvGrpSpPr>
+      <p:grpSpPr>
+        <a:xfrm>
+          <a:off x="0" y="0"/>
+          <a:ext cx="0" cy="0"/>
+          <a:chOff x="0" y="0"/>
+          <a:chExt cx="0" cy="0"/>
+        </a:xfrm>
+      </p:grpSpPr>
+      <p:grpSp>
+        <p:nvGrpSpPr>
+          <p:cNvPr id="2" name="组合 21"/>
+          <p:cNvGrpSpPr/>
+          <p:nvPr/>
+        </p:nvGrpSpPr>
+        <p:grpSpPr>
+          <a:xfrm>
+            <a:off x="342122" y="1018280"/>
+            <a:ext cx="8304245" cy="37323"/>
+            <a:chOff x="342122" y="873500"/>
+            <a:chExt cx="8304245" cy="37323"/>
+          </a:xfrm>
+        </p:grpSpPr>
+        <p:cxnSp>
+          <p:nvCxnSpPr>
+            <p:cNvPr id="23" name="直接连接符 22"/>
+            <p:cNvCxnSpPr/>
+            <p:nvPr/>
+          </p:nvCxnSpPr>
+          <p:spPr>
+            <a:xfrm>
+              <a:off x="342122" y="873500"/>
+              <a:ext cx="8304245" cy="0"/>
+            </a:xfrm>
+            <a:prstGeom prst="line">
+              <a:avLst/>
+            </a:prstGeom>
+            <a:ln w="19050">
+              <a:solidFill>
+                <a:schemeClr val="accent2">
+                  <a:lumMod val="50000"/>
+                </a:schemeClr>
+              </a:solidFill>
+            </a:ln>
+          </p:spPr>
+          <p:style>
+            <a:lnRef idx="1">
+              <a:schemeClr val="accent1"/>
+            </a:lnRef>
+            <a:fillRef idx="0">
+              <a:schemeClr val="accent1"/>
+            </a:fillRef>
+            <a:effectRef idx="0">
+              <a:schemeClr val="accent1"/>
+            </a:effectRef>
+            <a:fontRef idx="minor">
+              <a:schemeClr val="tx1"/>
+            </a:fontRef>
+          </p:style>
+        </p:cxnSp>
+        <p:cxnSp>
+          <p:nvCxnSpPr>
+            <p:cNvPr id="25" name="直接连接符 24"/>
+            <p:cNvCxnSpPr/>
+            <p:nvPr/>
+          </p:nvCxnSpPr>
+          <p:spPr>
+            <a:xfrm>
+              <a:off x="342122" y="910823"/>
+              <a:ext cx="5250025" cy="0"/>
+            </a:xfrm>
+            <a:prstGeom prst="line">
+              <a:avLst/>
+            </a:prstGeom>
+            <a:ln w="76200">
+              <a:solidFill>
+                <a:srgbClr val="6F1B1B"/>
+              </a:solidFill>
+            </a:ln>
+          </p:spPr>
+          <p:style>
+            <a:lnRef idx="1">
+              <a:schemeClr val="accent1"/>
+            </a:lnRef>
+            <a:fillRef idx="0">
+              <a:schemeClr val="accent1"/>
+            </a:fillRef>
+            <a:effectRef idx="0">
+              <a:schemeClr val="accent1"/>
+            </a:effectRef>
+            <a:fontRef idx="minor">
+              <a:schemeClr val="tx1"/>
+            </a:fontRef>
+          </p:style>
+        </p:cxnSp>
+      </p:grpSp>
+      <p:pic>
+        <p:nvPicPr>
+          <p:cNvPr id="34" name="图片 33"/>
+          <p:cNvPicPr>
+            <a:picLocks noChangeAspect="1"/>
+          </p:cNvPicPr>
+          <p:nvPr/>
+        </p:nvPicPr>
+        <p:blipFill>
+          <a:blip r:embed="rId3">
+            <a:extLst>
+              <a:ext uri="{28A0092B-C50C-407E-A947-70E740481C1C}">
+                <a14:useLocalDpi xmlns:a14="http://schemas.microsoft.com/office/drawing/2010/main" val="0"/>
+              </a:ext>
+            </a:extLst>
+          </a:blip>
+          <a:stretch>
+            <a:fillRect/>
+          </a:stretch>
+        </p:blipFill>
+        <p:spPr>
+          <a:xfrm>
+            <a:off x="6781211" y="258172"/>
+            <a:ext cx="1865156" cy="573535"/>
+          </a:xfrm>
+          <a:prstGeom prst="rect">
+            <a:avLst/>
+          </a:prstGeom>
+        </p:spPr>
+      </p:pic>
+      <p:sp>
+        <p:nvSpPr>
+          <p:cNvPr id="35" name="Rectangle 2"/>
+          <p:cNvSpPr>
+            <a:spLocks noGrp="1" noChangeArrowheads="1"/>
+          </p:cNvSpPr>
+          <p:nvPr>
+            <p:ph type="title"/>
+          </p:nvPr>
+        </p:nvSpPr>
+        <p:spPr>
+          <a:xfrm>
+            <a:off x="342122" y="174352"/>
+            <a:ext cx="8229600" cy="976586"/>
+          </a:xfrm>
+        </p:spPr>
+        <p:txBody>
+          <a:bodyPr>
+            <a:noAutofit/>
+          </a:bodyPr>
+          <a:lstStyle/>
+          <a:p>
+            <a:pPr>
+              <a:lnSpc>
+                <a:spcPct val="125000"/>
+              </a:lnSpc>
+              <a:buClr>
+                <a:srgbClr val="6F1B1B"/>
+              </a:buClr>
+            </a:pPr>
+            <a:r>
+              <a:rPr lang="zh-CN" altLang="en-US" sz="2000" b="1" dirty="0">
+                <a:solidFill>
+                  <a:srgbClr val="0070C0"/>
+                </a:solidFill>
+                <a:latin typeface="黑体" panose="02010609060101010101" pitchFamily="49" charset="-122"/>
+                <a:ea typeface="黑体" panose="02010609060101010101" pitchFamily="49" charset="-122"/>
+              </a:rPr>
+              <a:t>第三部分：</a:t>
+            </a:r>
+            <a:r>
+              <a:rPr lang="en-US" altLang="zh-CN" sz="2000" b="1" dirty="0">
+                <a:solidFill>
+                  <a:srgbClr val="0070C0"/>
+                </a:solidFill>
+                <a:latin typeface="黑体" panose="02010609060101010101" pitchFamily="49" charset="-122"/>
+                <a:ea typeface="黑体" panose="02010609060101010101" pitchFamily="49" charset="-122"/>
+              </a:rPr>
+              <a:t>CNSD</a:t>
+            </a:r>
+            <a:r>
+              <a:rPr lang="zh-CN" altLang="en-US" sz="2000" b="1" dirty="0">
+                <a:solidFill>
+                  <a:srgbClr val="0070C0"/>
+                </a:solidFill>
+                <a:latin typeface="黑体" panose="02010609060101010101" pitchFamily="49" charset="-122"/>
+                <a:ea typeface="黑体" panose="02010609060101010101" pitchFamily="49" charset="-122"/>
+              </a:rPr>
+              <a:t>中如何调用</a:t>
+            </a:r>
+            <a:r>
+              <a:rPr lang="en-US" altLang="zh-CN" sz="2000" b="1" dirty="0">
+                <a:solidFill>
+                  <a:srgbClr val="0070C0"/>
+                </a:solidFill>
+                <a:latin typeface="黑体" panose="02010609060101010101" pitchFamily="49" charset="-122"/>
+                <a:ea typeface="黑体" panose="02010609060101010101" pitchFamily="49" charset="-122"/>
+              </a:rPr>
+              <a:t>trt</a:t>
+            </a:r>
+            <a:r>
+              <a:rPr lang="zh-CN" altLang="en-US" sz="2000" b="1" dirty="0">
+                <a:solidFill>
+                  <a:srgbClr val="0070C0"/>
+                </a:solidFill>
+                <a:latin typeface="黑体" panose="02010609060101010101" pitchFamily="49" charset="-122"/>
+                <a:ea typeface="黑体" panose="02010609060101010101" pitchFamily="49" charset="-122"/>
+              </a:rPr>
+              <a:t>模型</a:t>
+            </a:r>
+            <a:endParaRPr lang="en-US" altLang="zh-CN" sz="2000" b="1" dirty="0">
+              <a:solidFill>
+                <a:srgbClr val="0070C0"/>
+              </a:solidFill>
+              <a:latin typeface="黑体" panose="02010609060101010101" pitchFamily="49" charset="-122"/>
+              <a:ea typeface="黑体" panose="02010609060101010101" pitchFamily="49" charset="-122"/>
+            </a:endParaRPr>
+          </a:p>
+        </p:txBody>
+      </p:sp>
+      <p:sp>
+        <p:nvSpPr>
+          <p:cNvPr id="9" name="Rectangle 3">
+            <a:extLst>
+              <a:ext uri="{FF2B5EF4-FFF2-40B4-BE49-F238E27FC236}">
+                <a16:creationId xmlns:a16="http://schemas.microsoft.com/office/drawing/2014/main" id="{18CE515B-665B-4A52-95B2-2E4137F84A29}"/>
+              </a:ext>
+            </a:extLst>
+          </p:cNvPr>
+          <p:cNvSpPr txBox="1">
+            <a:spLocks noChangeArrowheads="1"/>
+          </p:cNvSpPr>
+          <p:nvPr/>
+        </p:nvSpPr>
+        <p:spPr>
+          <a:xfrm>
+            <a:off x="342123" y="1165779"/>
+            <a:ext cx="8304244" cy="3785823"/>
+          </a:xfrm>
+          <a:prstGeom prst="rect">
+            <a:avLst/>
+          </a:prstGeom>
+        </p:spPr>
+        <p:txBody>
+          <a:bodyPr vert="horz" lIns="91440" tIns="45720" rIns="91440" bIns="45720" rtlCol="0">
+            <a:normAutofit fontScale="92500" lnSpcReduction="20000"/>
+          </a:bodyPr>
+          <a:lstStyle>
+            <a:lvl1pPr marL="171450" indent="-170815" algn="l" defTabSz="685800" rtl="0" eaLnBrk="1" latinLnBrk="0" hangingPunct="1">
+              <a:lnSpc>
+                <a:spcPct val="90000"/>
+              </a:lnSpc>
+              <a:spcBef>
+                <a:spcPts val="750"/>
+              </a:spcBef>
+              <a:buFont typeface="Arial" panose="020B0604020202020204" pitchFamily="34" charset="0"/>
+              <a:buChar char="•"/>
+              <a:defRPr sz="2100" kern="1200">
+                <a:solidFill>
+                  <a:schemeClr val="tx1"/>
+                </a:solidFill>
+                <a:latin typeface="+mn-lt"/>
+                <a:ea typeface="+mn-ea"/>
+                <a:cs typeface="+mn-cs"/>
+              </a:defRPr>
+            </a:lvl1pPr>
+            <a:lvl2pPr marL="514350" indent="-170815" algn="l" defTabSz="685800" rtl="0" eaLnBrk="1" latinLnBrk="0" hangingPunct="1">
+              <a:lnSpc>
+                <a:spcPct val="90000"/>
+              </a:lnSpc>
+              <a:spcBef>
+                <a:spcPts val="375"/>
+              </a:spcBef>
+              <a:buFont typeface="Arial" panose="020B0604020202020204" pitchFamily="34" charset="0"/>
+              <a:buChar char="•"/>
+              <a:defRPr sz="1800" kern="1200">
+                <a:solidFill>
+                  <a:schemeClr val="tx1"/>
+                </a:solidFill>
+                <a:latin typeface="+mn-lt"/>
+                <a:ea typeface="+mn-ea"/>
+                <a:cs typeface="+mn-cs"/>
+              </a:defRPr>
+            </a:lvl2pPr>
+            <a:lvl3pPr marL="857250" indent="-170815" algn="l" defTabSz="685800" rtl="0" eaLnBrk="1" latinLnBrk="0" hangingPunct="1">
+              <a:lnSpc>
+                <a:spcPct val="90000"/>
+              </a:lnSpc>
+              <a:spcBef>
+                <a:spcPts val="375"/>
+              </a:spcBef>
+              <a:buFont typeface="Arial" panose="020B0604020202020204" pitchFamily="34" charset="0"/>
+              <a:buChar char="•"/>
+              <a:defRPr sz="1500" kern="1200">
+                <a:solidFill>
+                  <a:schemeClr val="tx1"/>
+                </a:solidFill>
+                <a:latin typeface="+mn-lt"/>
+                <a:ea typeface="+mn-ea"/>
+                <a:cs typeface="+mn-cs"/>
+              </a:defRPr>
+            </a:lvl3pPr>
+            <a:lvl4pPr marL="1200150" indent="-170815" algn="l" defTabSz="685800" rtl="0" eaLnBrk="1" latinLnBrk="0" hangingPunct="1">
+              <a:lnSpc>
+                <a:spcPct val="90000"/>
+              </a:lnSpc>
+              <a:spcBef>
+                <a:spcPts val="375"/>
+              </a:spcBef>
+              <a:buFont typeface="Arial" panose="020B0604020202020204" pitchFamily="34" charset="0"/>
+              <a:buChar char="•"/>
+              <a:defRPr sz="1350" kern="1200">
+                <a:solidFill>
+                  <a:schemeClr val="tx1"/>
+                </a:solidFill>
+                <a:latin typeface="+mn-lt"/>
+                <a:ea typeface="+mn-ea"/>
+                <a:cs typeface="+mn-cs"/>
+              </a:defRPr>
+            </a:lvl4pPr>
+            <a:lvl5pPr marL="1543050" indent="-170815" algn="l" defTabSz="685800" rtl="0" eaLnBrk="1" latinLnBrk="0" hangingPunct="1">
+              <a:lnSpc>
+                <a:spcPct val="90000"/>
+              </a:lnSpc>
+              <a:spcBef>
+                <a:spcPts val="375"/>
+              </a:spcBef>
+              <a:buFont typeface="Arial" panose="020B0604020202020204" pitchFamily="34" charset="0"/>
+              <a:buChar char="•"/>
+              <a:defRPr sz="1350" kern="1200">
+                <a:solidFill>
+                  <a:schemeClr val="tx1"/>
+                </a:solidFill>
+                <a:latin typeface="+mn-lt"/>
+                <a:ea typeface="+mn-ea"/>
+                <a:cs typeface="+mn-cs"/>
+              </a:defRPr>
+            </a:lvl5pPr>
+            <a:lvl6pPr marL="1886585" indent="-170815" algn="l" defTabSz="685800" rtl="0" eaLnBrk="1" latinLnBrk="0" hangingPunct="1">
+              <a:lnSpc>
+                <a:spcPct val="90000"/>
+              </a:lnSpc>
+              <a:spcBef>
+                <a:spcPts val="375"/>
+              </a:spcBef>
+              <a:buFont typeface="Arial" panose="020B0604020202020204" pitchFamily="34" charset="0"/>
+              <a:buChar char="•"/>
+              <a:defRPr sz="1350" kern="1200">
+                <a:solidFill>
+                  <a:schemeClr val="tx1"/>
+                </a:solidFill>
+                <a:latin typeface="+mn-lt"/>
+                <a:ea typeface="+mn-ea"/>
+                <a:cs typeface="+mn-cs"/>
+              </a:defRPr>
+            </a:lvl6pPr>
+            <a:lvl7pPr marL="2229485" indent="-170815" algn="l" defTabSz="685800" rtl="0" eaLnBrk="1" latinLnBrk="0" hangingPunct="1">
+              <a:lnSpc>
+                <a:spcPct val="90000"/>
+              </a:lnSpc>
+              <a:spcBef>
+                <a:spcPts val="375"/>
+              </a:spcBef>
+              <a:buFont typeface="Arial" panose="020B0604020202020204" pitchFamily="34" charset="0"/>
+              <a:buChar char="•"/>
+              <a:defRPr sz="1350" kern="1200">
+                <a:solidFill>
+                  <a:schemeClr val="tx1"/>
+                </a:solidFill>
+                <a:latin typeface="+mn-lt"/>
+                <a:ea typeface="+mn-ea"/>
+                <a:cs typeface="+mn-cs"/>
+              </a:defRPr>
+            </a:lvl7pPr>
+            <a:lvl8pPr marL="2572385" indent="-170815" algn="l" defTabSz="685800" rtl="0" eaLnBrk="1" latinLnBrk="0" hangingPunct="1">
+              <a:lnSpc>
+                <a:spcPct val="90000"/>
+              </a:lnSpc>
+              <a:spcBef>
+                <a:spcPts val="375"/>
+              </a:spcBef>
+              <a:buFont typeface="Arial" panose="020B0604020202020204" pitchFamily="34" charset="0"/>
+              <a:buChar char="•"/>
+              <a:defRPr sz="1350" kern="1200">
+                <a:solidFill>
+                  <a:schemeClr val="tx1"/>
+                </a:solidFill>
+                <a:latin typeface="+mn-lt"/>
+                <a:ea typeface="+mn-ea"/>
+                <a:cs typeface="+mn-cs"/>
+              </a:defRPr>
+            </a:lvl8pPr>
+            <a:lvl9pPr marL="2915285" indent="-170815" algn="l" defTabSz="685800" rtl="0" eaLnBrk="1" latinLnBrk="0" hangingPunct="1">
+              <a:lnSpc>
+                <a:spcPct val="90000"/>
+              </a:lnSpc>
+              <a:spcBef>
+                <a:spcPts val="375"/>
+              </a:spcBef>
+              <a:buFont typeface="Arial" panose="020B0604020202020204" pitchFamily="34" charset="0"/>
+              <a:buChar char="•"/>
+              <a:defRPr sz="1350" kern="1200">
+                <a:solidFill>
+                  <a:schemeClr val="tx1"/>
+                </a:solidFill>
+                <a:latin typeface="+mn-lt"/>
+                <a:ea typeface="+mn-ea"/>
+                <a:cs typeface="+mn-cs"/>
+              </a:defRPr>
+            </a:lvl9pPr>
+          </a:lstStyle>
+          <a:p>
+            <a:pPr marL="635" indent="0">
+              <a:lnSpc>
+                <a:spcPct val="125000"/>
+              </a:lnSpc>
+              <a:buClr>
+                <a:srgbClr val="6F1B1B"/>
+              </a:buClr>
+              <a:buNone/>
+            </a:pPr>
+            <a:r>
+              <a:rPr lang="zh-CN" altLang="en-US" sz="1600" b="1" dirty="0">
+                <a:latin typeface="Cambria Math" panose="02040503050406030204" pitchFamily="18" charset="0"/>
+                <a:ea typeface="等线" panose="02010600030101010101" pitchFamily="2" charset="-122"/>
+                <a:cs typeface="ZWAdobeF" pitchFamily="2" charset="0"/>
+              </a:rPr>
+              <a:t>验证</a:t>
+            </a:r>
+            <a:r>
+              <a:rPr lang="en-US" altLang="zh-CN" sz="1600" b="1" dirty="0" err="1">
+                <a:latin typeface="Cambria Math" panose="02040503050406030204" pitchFamily="18" charset="0"/>
+                <a:ea typeface="等线" panose="02010600030101010101" pitchFamily="2" charset="-122"/>
+                <a:cs typeface="ZWAdobeF" pitchFamily="2" charset="0"/>
+              </a:rPr>
+              <a:t>trt</a:t>
+            </a:r>
+            <a:r>
+              <a:rPr lang="zh-CN" altLang="en-US" sz="1600" b="1" dirty="0">
+                <a:latin typeface="Cambria Math" panose="02040503050406030204" pitchFamily="18" charset="0"/>
+                <a:ea typeface="等线" panose="02010600030101010101" pitchFamily="2" charset="-122"/>
+                <a:cs typeface="ZWAdobeF" pitchFamily="2" charset="0"/>
+              </a:rPr>
+              <a:t>模型是否能用（无</a:t>
+            </a:r>
+            <a:r>
+              <a:rPr lang="en-US" altLang="zh-CN" sz="1600" b="1" dirty="0">
+                <a:latin typeface="Cambria Math" panose="02040503050406030204" pitchFamily="18" charset="0"/>
+                <a:ea typeface="等线" panose="02010600030101010101" pitchFamily="2" charset="-122"/>
+                <a:cs typeface="ZWAdobeF" pitchFamily="2" charset="0"/>
+              </a:rPr>
+              <a:t>Nan</a:t>
+            </a:r>
+            <a:r>
+              <a:rPr lang="zh-CN" altLang="en-US" sz="1600" b="1" dirty="0">
+                <a:latin typeface="Cambria Math" panose="02040503050406030204" pitchFamily="18" charset="0"/>
+                <a:ea typeface="等线" panose="02010600030101010101" pitchFamily="2" charset="-122"/>
+                <a:cs typeface="ZWAdobeF" pitchFamily="2" charset="0"/>
+              </a:rPr>
+              <a:t>）：</a:t>
+            </a:r>
+            <a:endParaRPr lang="en-US" altLang="zh-CN" sz="1600" b="1" dirty="0">
+              <a:latin typeface="Cambria Math" panose="02040503050406030204" pitchFamily="18" charset="0"/>
+              <a:ea typeface="等线" panose="02010600030101010101" pitchFamily="2" charset="-122"/>
+              <a:cs typeface="ZWAdobeF" pitchFamily="2" charset="0"/>
+            </a:endParaRPr>
+          </a:p>
+          <a:p>
+            <a:pPr marL="635" indent="0">
+              <a:lnSpc>
+                <a:spcPct val="125000"/>
+              </a:lnSpc>
+              <a:buClr>
+                <a:srgbClr val="6F1B1B"/>
+              </a:buClr>
+              <a:buNone/>
+            </a:pPr>
+            <a:r>
+              <a:rPr lang="en-US" altLang="zh-CN" sz="1000" dirty="0">
+                <a:latin typeface="Cambria Math" panose="02040503050406030204" pitchFamily="18" charset="0"/>
+                <a:ea typeface="等线" panose="02010600030101010101" pitchFamily="2" charset="-122"/>
+                <a:cs typeface="ZWAdobeF" pitchFamily="2" charset="0"/>
+              </a:rPr>
+              <a:t>from Engine import Engine</a:t>
+            </a:r>
+          </a:p>
+          <a:p>
+            <a:pPr marL="635" indent="0">
+              <a:lnSpc>
+                <a:spcPct val="125000"/>
+              </a:lnSpc>
+              <a:buClr>
+                <a:srgbClr val="6F1B1B"/>
+              </a:buClr>
+              <a:buNone/>
+            </a:pPr>
+            <a:r>
+              <a:rPr lang="en-US" altLang="zh-CN" sz="1000" dirty="0">
+                <a:latin typeface="Cambria Math" panose="02040503050406030204" pitchFamily="18" charset="0"/>
+                <a:ea typeface="等线" panose="02010600030101010101" pitchFamily="2" charset="-122"/>
+                <a:cs typeface="ZWAdobeF" pitchFamily="2" charset="0"/>
+              </a:rPr>
+              <a:t>import torch</a:t>
+            </a:r>
+          </a:p>
+          <a:p>
+            <a:pPr marL="635" indent="0">
+              <a:lnSpc>
+                <a:spcPct val="125000"/>
+              </a:lnSpc>
+              <a:buClr>
+                <a:srgbClr val="6F1B1B"/>
+              </a:buClr>
+              <a:buNone/>
+            </a:pPr>
+            <a:endParaRPr lang="en-US" altLang="zh-CN" sz="1000" dirty="0">
+              <a:latin typeface="Cambria Math" panose="02040503050406030204" pitchFamily="18" charset="0"/>
+              <a:ea typeface="等线" panose="02010600030101010101" pitchFamily="2" charset="-122"/>
+              <a:cs typeface="ZWAdobeF" pitchFamily="2" charset="0"/>
+            </a:endParaRPr>
+          </a:p>
+          <a:p>
+            <a:pPr marL="635" indent="0">
+              <a:lnSpc>
+                <a:spcPct val="125000"/>
+              </a:lnSpc>
+              <a:buClr>
+                <a:srgbClr val="6F1B1B"/>
+              </a:buClr>
+              <a:buNone/>
+            </a:pPr>
+            <a:r>
+              <a:rPr lang="en-US" altLang="zh-CN" sz="1000" dirty="0" err="1">
+                <a:latin typeface="Cambria Math" panose="02040503050406030204" pitchFamily="18" charset="0"/>
+                <a:ea typeface="等线" panose="02010600030101010101" pitchFamily="2" charset="-122"/>
+                <a:cs typeface="ZWAdobeF" pitchFamily="2" charset="0"/>
+              </a:rPr>
+              <a:t>clip_engine_path</a:t>
+            </a:r>
+            <a:r>
+              <a:rPr lang="en-US" altLang="zh-CN" sz="1000" dirty="0">
+                <a:latin typeface="Cambria Math" panose="02040503050406030204" pitchFamily="18" charset="0"/>
+                <a:ea typeface="等线" panose="02010600030101010101" pitchFamily="2" charset="-122"/>
+                <a:cs typeface="ZWAdobeF" pitchFamily="2" charset="0"/>
+              </a:rPr>
+              <a:t> = "/data/Projects/</a:t>
+            </a:r>
+            <a:r>
+              <a:rPr lang="en-US" altLang="zh-CN" sz="1000" dirty="0" err="1">
+                <a:latin typeface="Cambria Math" panose="02040503050406030204" pitchFamily="18" charset="0"/>
+                <a:ea typeface="等线" panose="02010600030101010101" pitchFamily="2" charset="-122"/>
+                <a:cs typeface="ZWAdobeF" pitchFamily="2" charset="0"/>
+              </a:rPr>
+              <a:t>StableDiffusionEO</a:t>
+            </a:r>
+            <a:r>
+              <a:rPr lang="en-US" altLang="zh-CN" sz="1000" dirty="0">
+                <a:latin typeface="Cambria Math" panose="02040503050406030204" pitchFamily="18" charset="0"/>
+                <a:ea typeface="等线" panose="02010600030101010101" pitchFamily="2" charset="-122"/>
+                <a:cs typeface="ZWAdobeF" pitchFamily="2" charset="0"/>
+              </a:rPr>
+              <a:t>/engine/CLIP_work1_float32_opt.plan"</a:t>
+            </a:r>
+          </a:p>
+          <a:p>
+            <a:pPr marL="635" indent="0">
+              <a:lnSpc>
+                <a:spcPct val="125000"/>
+              </a:lnSpc>
+              <a:buClr>
+                <a:srgbClr val="6F1B1B"/>
+              </a:buClr>
+              <a:buNone/>
+            </a:pPr>
+            <a:r>
+              <a:rPr lang="en-US" altLang="zh-CN" sz="1000" dirty="0" err="1">
+                <a:latin typeface="Cambria Math" panose="02040503050406030204" pitchFamily="18" charset="0"/>
+                <a:ea typeface="等线" panose="02010600030101010101" pitchFamily="2" charset="-122"/>
+                <a:cs typeface="ZWAdobeF" pitchFamily="2" charset="0"/>
+              </a:rPr>
+              <a:t>clip_engine</a:t>
+            </a:r>
+            <a:r>
+              <a:rPr lang="en-US" altLang="zh-CN" sz="1000" dirty="0">
+                <a:latin typeface="Cambria Math" panose="02040503050406030204" pitchFamily="18" charset="0"/>
+                <a:ea typeface="等线" panose="02010600030101010101" pitchFamily="2" charset="-122"/>
+                <a:cs typeface="ZWAdobeF" pitchFamily="2" charset="0"/>
+              </a:rPr>
+              <a:t> = Engine(</a:t>
+            </a:r>
+            <a:r>
+              <a:rPr lang="en-US" altLang="zh-CN" sz="1000" dirty="0" err="1">
+                <a:latin typeface="Cambria Math" panose="02040503050406030204" pitchFamily="18" charset="0"/>
+                <a:ea typeface="等线" panose="02010600030101010101" pitchFamily="2" charset="-122"/>
+                <a:cs typeface="ZWAdobeF" pitchFamily="2" charset="0"/>
+              </a:rPr>
+              <a:t>clip_engine_path</a:t>
+            </a:r>
+            <a:r>
+              <a:rPr lang="en-US" altLang="zh-CN" sz="1000" dirty="0">
+                <a:latin typeface="Cambria Math" panose="02040503050406030204" pitchFamily="18" charset="0"/>
+                <a:ea typeface="等线" panose="02010600030101010101" pitchFamily="2" charset="-122"/>
+                <a:cs typeface="ZWAdobeF" pitchFamily="2" charset="0"/>
+              </a:rPr>
+              <a:t>)</a:t>
+            </a:r>
+          </a:p>
+          <a:p>
+            <a:pPr marL="635" indent="0">
+              <a:lnSpc>
+                <a:spcPct val="125000"/>
+              </a:lnSpc>
+              <a:buClr>
+                <a:srgbClr val="6F1B1B"/>
+              </a:buClr>
+              <a:buNone/>
+            </a:pPr>
+            <a:r>
+              <a:rPr lang="en-US" altLang="zh-CN" sz="1000" dirty="0" err="1">
+                <a:latin typeface="Cambria Math" panose="02040503050406030204" pitchFamily="18" charset="0"/>
+                <a:ea typeface="等线" panose="02010600030101010101" pitchFamily="2" charset="-122"/>
+                <a:cs typeface="ZWAdobeF" pitchFamily="2" charset="0"/>
+              </a:rPr>
+              <a:t>clip_engine.load</a:t>
+            </a:r>
+            <a:r>
+              <a:rPr lang="en-US" altLang="zh-CN" sz="1000" dirty="0">
+                <a:latin typeface="Cambria Math" panose="02040503050406030204" pitchFamily="18" charset="0"/>
+                <a:ea typeface="等线" panose="02010600030101010101" pitchFamily="2" charset="-122"/>
+                <a:cs typeface="ZWAdobeF" pitchFamily="2" charset="0"/>
+              </a:rPr>
+              <a:t>()</a:t>
+            </a:r>
+          </a:p>
+          <a:p>
+            <a:pPr marL="635" indent="0">
+              <a:lnSpc>
+                <a:spcPct val="125000"/>
+              </a:lnSpc>
+              <a:buClr>
+                <a:srgbClr val="6F1B1B"/>
+              </a:buClr>
+              <a:buNone/>
+            </a:pPr>
+            <a:r>
+              <a:rPr lang="en-US" altLang="zh-CN" sz="1000" dirty="0" err="1">
+                <a:latin typeface="Cambria Math" panose="02040503050406030204" pitchFamily="18" charset="0"/>
+                <a:ea typeface="等线" panose="02010600030101010101" pitchFamily="2" charset="-122"/>
+                <a:cs typeface="ZWAdobeF" pitchFamily="2" charset="0"/>
+              </a:rPr>
+              <a:t>model_feed_dict</a:t>
+            </a:r>
+            <a:r>
+              <a:rPr lang="en-US" altLang="zh-CN" sz="1000" dirty="0">
+                <a:latin typeface="Cambria Math" panose="02040503050406030204" pitchFamily="18" charset="0"/>
+                <a:ea typeface="等线" panose="02010600030101010101" pitchFamily="2" charset="-122"/>
+                <a:cs typeface="ZWAdobeF" pitchFamily="2" charset="0"/>
+              </a:rPr>
+              <a:t> = </a:t>
+            </a:r>
+            <a:r>
+              <a:rPr lang="en-US" altLang="zh-CN" sz="1000" dirty="0" err="1">
+                <a:latin typeface="Cambria Math" panose="02040503050406030204" pitchFamily="18" charset="0"/>
+                <a:ea typeface="等线" panose="02010600030101010101" pitchFamily="2" charset="-122"/>
+                <a:cs typeface="ZWAdobeF" pitchFamily="2" charset="0"/>
+              </a:rPr>
+              <a:t>clip_engine.clip_model_shape_dict</a:t>
+            </a:r>
+            <a:r>
+              <a:rPr lang="en-US" altLang="zh-CN" sz="1000" dirty="0">
+                <a:latin typeface="Cambria Math" panose="02040503050406030204" pitchFamily="18" charset="0"/>
+                <a:ea typeface="等线" panose="02010600030101010101" pitchFamily="2" charset="-122"/>
+                <a:cs typeface="ZWAdobeF" pitchFamily="2" charset="0"/>
+              </a:rPr>
+              <a:t>(1, 77, </a:t>
+            </a:r>
+            <a:r>
+              <a:rPr lang="en-US" altLang="zh-CN" sz="1000" dirty="0" err="1">
+                <a:latin typeface="Cambria Math" panose="02040503050406030204" pitchFamily="18" charset="0"/>
+                <a:ea typeface="等线" panose="02010600030101010101" pitchFamily="2" charset="-122"/>
+                <a:cs typeface="ZWAdobeF" pitchFamily="2" charset="0"/>
+              </a:rPr>
+              <a:t>embedding_dim</a:t>
+            </a:r>
+            <a:r>
+              <a:rPr lang="en-US" altLang="zh-CN" sz="1000" dirty="0">
+                <a:latin typeface="Cambria Math" panose="02040503050406030204" pitchFamily="18" charset="0"/>
+                <a:ea typeface="等线" panose="02010600030101010101" pitchFamily="2" charset="-122"/>
+                <a:cs typeface="ZWAdobeF" pitchFamily="2" charset="0"/>
+              </a:rPr>
+              <a:t> = 768)</a:t>
+            </a:r>
+          </a:p>
+          <a:p>
+            <a:pPr marL="635" indent="0">
+              <a:lnSpc>
+                <a:spcPct val="125000"/>
+              </a:lnSpc>
+              <a:buClr>
+                <a:srgbClr val="6F1B1B"/>
+              </a:buClr>
+              <a:buNone/>
+            </a:pPr>
+            <a:r>
+              <a:rPr lang="en-US" altLang="zh-CN" sz="1000" dirty="0" err="1">
+                <a:latin typeface="Cambria Math" panose="02040503050406030204" pitchFamily="18" charset="0"/>
+                <a:ea typeface="等线" panose="02010600030101010101" pitchFamily="2" charset="-122"/>
+                <a:cs typeface="ZWAdobeF" pitchFamily="2" charset="0"/>
+              </a:rPr>
+              <a:t>clip_engine.activate</a:t>
+            </a:r>
+            <a:r>
+              <a:rPr lang="en-US" altLang="zh-CN" sz="1000" dirty="0">
+                <a:latin typeface="Cambria Math" panose="02040503050406030204" pitchFamily="18" charset="0"/>
+                <a:ea typeface="等线" panose="02010600030101010101" pitchFamily="2" charset="-122"/>
+                <a:cs typeface="ZWAdobeF" pitchFamily="2" charset="0"/>
+              </a:rPr>
+              <a:t>()</a:t>
+            </a:r>
+          </a:p>
+          <a:p>
+            <a:pPr marL="635" indent="0">
+              <a:lnSpc>
+                <a:spcPct val="125000"/>
+              </a:lnSpc>
+              <a:buClr>
+                <a:srgbClr val="6F1B1B"/>
+              </a:buClr>
+              <a:buNone/>
+            </a:pPr>
+            <a:r>
+              <a:rPr lang="en-US" altLang="zh-CN" sz="1000" dirty="0" err="1">
+                <a:latin typeface="Cambria Math" panose="02040503050406030204" pitchFamily="18" charset="0"/>
+                <a:ea typeface="等线" panose="02010600030101010101" pitchFamily="2" charset="-122"/>
+                <a:cs typeface="ZWAdobeF" pitchFamily="2" charset="0"/>
+              </a:rPr>
+              <a:t>clip_engine.allocate_buffers</a:t>
+            </a:r>
+            <a:r>
+              <a:rPr lang="en-US" altLang="zh-CN" sz="1000" dirty="0">
+                <a:latin typeface="Cambria Math" panose="02040503050406030204" pitchFamily="18" charset="0"/>
+                <a:ea typeface="等线" panose="02010600030101010101" pitchFamily="2" charset="-122"/>
+                <a:cs typeface="ZWAdobeF" pitchFamily="2" charset="0"/>
+              </a:rPr>
+              <a:t>(</a:t>
+            </a:r>
+            <a:r>
+              <a:rPr lang="en-US" altLang="zh-CN" sz="1000" dirty="0" err="1">
+                <a:latin typeface="Cambria Math" panose="02040503050406030204" pitchFamily="18" charset="0"/>
+                <a:ea typeface="等线" panose="02010600030101010101" pitchFamily="2" charset="-122"/>
+                <a:cs typeface="ZWAdobeF" pitchFamily="2" charset="0"/>
+              </a:rPr>
+              <a:t>model_feed_dict</a:t>
+            </a:r>
+            <a:r>
+              <a:rPr lang="en-US" altLang="zh-CN" sz="1000" dirty="0">
+                <a:latin typeface="Cambria Math" panose="02040503050406030204" pitchFamily="18" charset="0"/>
+                <a:ea typeface="等线" panose="02010600030101010101" pitchFamily="2" charset="-122"/>
+                <a:cs typeface="ZWAdobeF" pitchFamily="2" charset="0"/>
+              </a:rPr>
+              <a:t>)</a:t>
+            </a:r>
+          </a:p>
+          <a:p>
+            <a:pPr marL="635" indent="0">
+              <a:lnSpc>
+                <a:spcPct val="125000"/>
+              </a:lnSpc>
+              <a:buClr>
+                <a:srgbClr val="6F1B1B"/>
+              </a:buClr>
+              <a:buNone/>
+            </a:pPr>
+            <a:r>
+              <a:rPr lang="en-US" altLang="zh-CN" sz="1000" dirty="0" err="1">
+                <a:latin typeface="Cambria Math" panose="02040503050406030204" pitchFamily="18" charset="0"/>
+                <a:ea typeface="等线" panose="02010600030101010101" pitchFamily="2" charset="-122"/>
+                <a:cs typeface="ZWAdobeF" pitchFamily="2" charset="0"/>
+              </a:rPr>
+              <a:t>clip_engine.get_engine_infor</a:t>
+            </a:r>
+            <a:r>
+              <a:rPr lang="en-US" altLang="zh-CN" sz="1000" dirty="0">
+                <a:latin typeface="Cambria Math" panose="02040503050406030204" pitchFamily="18" charset="0"/>
+                <a:ea typeface="等线" panose="02010600030101010101" pitchFamily="2" charset="-122"/>
+                <a:cs typeface="ZWAdobeF" pitchFamily="2" charset="0"/>
+              </a:rPr>
+              <a:t>()</a:t>
+            </a:r>
+          </a:p>
+          <a:p>
+            <a:pPr marL="635" indent="0">
+              <a:lnSpc>
+                <a:spcPct val="125000"/>
+              </a:lnSpc>
+              <a:buClr>
+                <a:srgbClr val="6F1B1B"/>
+              </a:buClr>
+              <a:buNone/>
+            </a:pPr>
+            <a:r>
+              <a:rPr lang="en-US" altLang="zh-CN" sz="1000" dirty="0">
+                <a:latin typeface="Cambria Math" panose="02040503050406030204" pitchFamily="18" charset="0"/>
+                <a:ea typeface="等线" panose="02010600030101010101" pitchFamily="2" charset="-122"/>
+                <a:cs typeface="ZWAdobeF" pitchFamily="2" charset="0"/>
+              </a:rPr>
+              <a:t>    </a:t>
+            </a:r>
+          </a:p>
+          <a:p>
+            <a:pPr marL="635" indent="0">
+              <a:lnSpc>
+                <a:spcPct val="125000"/>
+              </a:lnSpc>
+              <a:buClr>
+                <a:srgbClr val="6F1B1B"/>
+              </a:buClr>
+              <a:buNone/>
+            </a:pPr>
+            <a:r>
+              <a:rPr lang="en-US" altLang="zh-CN" sz="1000" dirty="0">
+                <a:latin typeface="Cambria Math" panose="02040503050406030204" pitchFamily="18" charset="0"/>
+                <a:ea typeface="等线" panose="02010600030101010101" pitchFamily="2" charset="-122"/>
+                <a:cs typeface="ZWAdobeF" pitchFamily="2" charset="0"/>
+              </a:rPr>
+              <a:t>tokens = </a:t>
+            </a:r>
+            <a:r>
+              <a:rPr lang="en-US" altLang="zh-CN" sz="1000" dirty="0" err="1">
+                <a:latin typeface="Cambria Math" panose="02040503050406030204" pitchFamily="18" charset="0"/>
+                <a:ea typeface="等线" panose="02010600030101010101" pitchFamily="2" charset="-122"/>
+                <a:cs typeface="ZWAdobeF" pitchFamily="2" charset="0"/>
+              </a:rPr>
+              <a:t>torch.randint</a:t>
+            </a:r>
+            <a:r>
+              <a:rPr lang="en-US" altLang="zh-CN" sz="1000" dirty="0">
+                <a:latin typeface="Cambria Math" panose="02040503050406030204" pitchFamily="18" charset="0"/>
+                <a:ea typeface="等线" panose="02010600030101010101" pitchFamily="2" charset="-122"/>
+                <a:cs typeface="ZWAdobeF" pitchFamily="2" charset="0"/>
+              </a:rPr>
+              <a:t>(low=0, high=40000, size=(1, 77), </a:t>
+            </a:r>
+            <a:r>
+              <a:rPr lang="en-US" altLang="zh-CN" sz="1000" dirty="0" err="1">
+                <a:latin typeface="Cambria Math" panose="02040503050406030204" pitchFamily="18" charset="0"/>
+                <a:ea typeface="等线" panose="02010600030101010101" pitchFamily="2" charset="-122"/>
+                <a:cs typeface="ZWAdobeF" pitchFamily="2" charset="0"/>
+              </a:rPr>
+              <a:t>dtype</a:t>
+            </a:r>
+            <a:r>
+              <a:rPr lang="en-US" altLang="zh-CN" sz="1000" dirty="0">
+                <a:latin typeface="Cambria Math" panose="02040503050406030204" pitchFamily="18" charset="0"/>
+                <a:ea typeface="等线" panose="02010600030101010101" pitchFamily="2" charset="-122"/>
+                <a:cs typeface="ZWAdobeF" pitchFamily="2" charset="0"/>
+              </a:rPr>
+              <a:t>=torch.int32)  # </a:t>
+            </a:r>
+            <a:r>
+              <a:rPr lang="en-US" altLang="zh-CN" sz="1000" dirty="0" err="1">
+                <a:latin typeface="Cambria Math" panose="02040503050406030204" pitchFamily="18" charset="0"/>
+                <a:ea typeface="等线" panose="02010600030101010101" pitchFamily="2" charset="-122"/>
+                <a:cs typeface="ZWAdobeF" pitchFamily="2" charset="0"/>
+              </a:rPr>
+              <a:t>torch.onnx.export</a:t>
+            </a:r>
+            <a:r>
+              <a:rPr lang="zh-CN" altLang="en-US" sz="1000" dirty="0">
+                <a:latin typeface="Cambria Math" panose="02040503050406030204" pitchFamily="18" charset="0"/>
+                <a:ea typeface="等线" panose="02010600030101010101" pitchFamily="2" charset="-122"/>
+                <a:cs typeface="ZWAdobeF" pitchFamily="2" charset="0"/>
+              </a:rPr>
+              <a:t>参数</a:t>
+            </a:r>
+          </a:p>
+          <a:p>
+            <a:pPr marL="635" indent="0">
+              <a:lnSpc>
+                <a:spcPct val="125000"/>
+              </a:lnSpc>
+              <a:buClr>
+                <a:srgbClr val="6F1B1B"/>
+              </a:buClr>
+              <a:buNone/>
+            </a:pPr>
+            <a:r>
+              <a:rPr lang="en-US" altLang="zh-CN" sz="1000" dirty="0" err="1">
+                <a:latin typeface="Cambria Math" panose="02040503050406030204" pitchFamily="18" charset="0"/>
+                <a:ea typeface="等线" panose="02010600030101010101" pitchFamily="2" charset="-122"/>
+                <a:cs typeface="ZWAdobeF" pitchFamily="2" charset="0"/>
+              </a:rPr>
+              <a:t>outputs_trt</a:t>
+            </a:r>
+            <a:r>
+              <a:rPr lang="en-US" altLang="zh-CN" sz="1000" dirty="0">
+                <a:latin typeface="Cambria Math" panose="02040503050406030204" pitchFamily="18" charset="0"/>
+                <a:ea typeface="等线" panose="02010600030101010101" pitchFamily="2" charset="-122"/>
+                <a:cs typeface="ZWAdobeF" pitchFamily="2" charset="0"/>
+              </a:rPr>
+              <a:t> = </a:t>
+            </a:r>
+            <a:r>
+              <a:rPr lang="en-US" altLang="zh-CN" sz="1000" dirty="0" err="1">
+                <a:latin typeface="Cambria Math" panose="02040503050406030204" pitchFamily="18" charset="0"/>
+                <a:ea typeface="等线" panose="02010600030101010101" pitchFamily="2" charset="-122"/>
+                <a:cs typeface="ZWAdobeF" pitchFamily="2" charset="0"/>
+              </a:rPr>
+              <a:t>clip_engine.infer</a:t>
+            </a:r>
+            <a:r>
+              <a:rPr lang="en-US" altLang="zh-CN" sz="1000" dirty="0">
+                <a:latin typeface="Cambria Math" panose="02040503050406030204" pitchFamily="18" charset="0"/>
+                <a:ea typeface="等线" panose="02010600030101010101" pitchFamily="2" charset="-122"/>
+                <a:cs typeface="ZWAdobeF" pitchFamily="2" charset="0"/>
+              </a:rPr>
+              <a:t>({"</a:t>
+            </a:r>
+            <a:r>
+              <a:rPr lang="en-US" altLang="zh-CN" sz="1000" dirty="0" err="1">
+                <a:latin typeface="Cambria Math" panose="02040503050406030204" pitchFamily="18" charset="0"/>
+                <a:ea typeface="等线" panose="02010600030101010101" pitchFamily="2" charset="-122"/>
+                <a:cs typeface="ZWAdobeF" pitchFamily="2" charset="0"/>
+              </a:rPr>
+              <a:t>input_ids":tokens</a:t>
+            </a:r>
+            <a:r>
+              <a:rPr lang="en-US" altLang="zh-CN" sz="1000" dirty="0">
+                <a:latin typeface="Cambria Math" panose="02040503050406030204" pitchFamily="18" charset="0"/>
+                <a:ea typeface="等线" panose="02010600030101010101" pitchFamily="2" charset="-122"/>
+                <a:cs typeface="ZWAdobeF" pitchFamily="2" charset="0"/>
+              </a:rPr>
+              <a:t>})['</a:t>
+            </a:r>
+            <a:r>
+              <a:rPr lang="en-US" altLang="zh-CN" sz="1000" dirty="0" err="1">
+                <a:latin typeface="Cambria Math" panose="02040503050406030204" pitchFamily="18" charset="0"/>
+                <a:ea typeface="等线" panose="02010600030101010101" pitchFamily="2" charset="-122"/>
+                <a:cs typeface="ZWAdobeF" pitchFamily="2" charset="0"/>
+              </a:rPr>
+              <a:t>last_hidden_state</a:t>
+            </a:r>
+            <a:r>
+              <a:rPr lang="en-US" altLang="zh-CN" sz="1000" dirty="0">
+                <a:latin typeface="Cambria Math" panose="02040503050406030204" pitchFamily="18" charset="0"/>
+                <a:ea typeface="等线" panose="02010600030101010101" pitchFamily="2" charset="-122"/>
+                <a:cs typeface="ZWAdobeF" pitchFamily="2" charset="0"/>
+              </a:rPr>
+              <a:t>'].clone()</a:t>
+            </a:r>
+          </a:p>
+          <a:p>
+            <a:pPr marL="635" indent="0">
+              <a:lnSpc>
+                <a:spcPct val="125000"/>
+              </a:lnSpc>
+              <a:buClr>
+                <a:srgbClr val="6F1B1B"/>
+              </a:buClr>
+              <a:buNone/>
+            </a:pPr>
+            <a:r>
+              <a:rPr lang="en-US" altLang="zh-CN" sz="1000" dirty="0">
+                <a:latin typeface="Cambria Math" panose="02040503050406030204" pitchFamily="18" charset="0"/>
+                <a:ea typeface="等线" panose="02010600030101010101" pitchFamily="2" charset="-122"/>
+                <a:cs typeface="ZWAdobeF" pitchFamily="2" charset="0"/>
+              </a:rPr>
+              <a:t>print(</a:t>
+            </a:r>
+            <a:r>
+              <a:rPr lang="en-US" altLang="zh-CN" sz="1000" dirty="0" err="1">
+                <a:latin typeface="Cambria Math" panose="02040503050406030204" pitchFamily="18" charset="0"/>
+                <a:ea typeface="等线" panose="02010600030101010101" pitchFamily="2" charset="-122"/>
+                <a:cs typeface="ZWAdobeF" pitchFamily="2" charset="0"/>
+              </a:rPr>
+              <a:t>outputs_trt</a:t>
+            </a:r>
+            <a:r>
+              <a:rPr lang="en-US" altLang="zh-CN" sz="1000" dirty="0">
+                <a:latin typeface="Cambria Math" panose="02040503050406030204" pitchFamily="18" charset="0"/>
+                <a:ea typeface="等线" panose="02010600030101010101" pitchFamily="2" charset="-122"/>
+                <a:cs typeface="ZWAdobeF" pitchFamily="2" charset="0"/>
+              </a:rPr>
+              <a:t>)</a:t>
+            </a:r>
+          </a:p>
+        </p:txBody>
+      </p:sp>
+    </p:spTree>
+    <p:extLst>
+      <p:ext uri="{BB962C8B-B14F-4D97-AF65-F5344CB8AC3E}">
+        <p14:creationId xmlns:p14="http://schemas.microsoft.com/office/powerpoint/2010/main" val="1207589039"/>
+      </p:ext>
+    </p:extLst>
+  </p:cSld>
+  <p:clrMapOvr>
+    <a:masterClrMapping/>
+  </p:clrMapOvr>
+</p:sld>
+</file>
+
+<file path=ppt/slides/slide13.xml><?xml version="1.0" encoding="utf-8"?>
+<p:sld xmlns:a="http://schemas.openxmlformats.org/drawingml/2006/main" xmlns:r="http://schemas.openxmlformats.org/officeDocument/2006/relationships" xmlns:p="http://schemas.openxmlformats.org/presentationml/2006/main">
+  <p:cSld>
     <p:bg>
       <p:bgPr>
         <a:solidFill>
@@ -7252,7 +8349,7 @@
 </p:sld>
 </file>
 
-<file path=ppt/slides/slide13.xml><?xml version="1.0" encoding="utf-8"?>
+<file path=ppt/slides/slide14.xml><?xml version="1.0" encoding="utf-8"?>
 <p:sld xmlns:a="http://schemas.openxmlformats.org/drawingml/2006/main" xmlns:r="http://schemas.openxmlformats.org/officeDocument/2006/relationships" xmlns:p="http://schemas.openxmlformats.org/presentationml/2006/main">
   <p:cSld>
     <p:bg>
@@ -8626,6 +9723,82 @@
               <a:t>模型输出差异</a:t>
             </a:r>
             <a:endParaRPr lang="en-US" altLang="zh-CN" sz="1400" dirty="0">
+              <a:latin typeface="Cambria Math" panose="02040503050406030204" pitchFamily="18" charset="0"/>
+              <a:ea typeface="等线" panose="02010600030101010101" pitchFamily="2" charset="-122"/>
+              <a:cs typeface="ZWAdobeF" pitchFamily="2" charset="0"/>
+            </a:endParaRPr>
+          </a:p>
+          <a:p>
+            <a:pPr marL="343535" indent="-342900">
+              <a:lnSpc>
+                <a:spcPct val="100000"/>
+              </a:lnSpc>
+              <a:spcBef>
+                <a:spcPts val="0"/>
+              </a:spcBef>
+              <a:buClr>
+                <a:srgbClr val="6F1B1B"/>
+              </a:buClr>
+              <a:buFont typeface="+mj-lt"/>
+              <a:buAutoNum type="arabicPeriod"/>
+            </a:pPr>
+            <a:r>
+              <a:rPr lang="zh-CN" altLang="en-US" sz="1400" b="1" dirty="0">
+                <a:latin typeface="Cambria Math" panose="02040503050406030204" pitchFamily="18" charset="0"/>
+                <a:ea typeface="等线" panose="02010600030101010101" pitchFamily="2" charset="-122"/>
+                <a:cs typeface="ZWAdobeF" pitchFamily="2" charset="0"/>
+              </a:rPr>
+              <a:t>工程问题：切记不能在</a:t>
+            </a:r>
+            <a:r>
+              <a:rPr lang="en-US" altLang="zh-CN" sz="1400" b="1" dirty="0" err="1">
+                <a:latin typeface="Cambria Math" panose="02040503050406030204" pitchFamily="18" charset="0"/>
+                <a:ea typeface="等线" panose="02010600030101010101" pitchFamily="2" charset="-122"/>
+                <a:cs typeface="ZWAdobeF" pitchFamily="2" charset="0"/>
+              </a:rPr>
+              <a:t>trt</a:t>
+            </a:r>
+            <a:r>
+              <a:rPr lang="zh-CN" altLang="en-US" sz="1400" b="1" dirty="0">
+                <a:latin typeface="Cambria Math" panose="02040503050406030204" pitchFamily="18" charset="0"/>
+                <a:ea typeface="等线" panose="02010600030101010101" pitchFamily="2" charset="-122"/>
+                <a:cs typeface="ZWAdobeF" pitchFamily="2" charset="0"/>
+              </a:rPr>
+              <a:t>模式下将</a:t>
+            </a:r>
+            <a:r>
+              <a:rPr lang="en-US" altLang="zh-CN" sz="1400" b="1" dirty="0">
+                <a:latin typeface="Cambria Math" panose="02040503050406030204" pitchFamily="18" charset="0"/>
+                <a:ea typeface="等线" panose="02010600030101010101" pitchFamily="2" charset="-122"/>
+                <a:cs typeface="ZWAdobeF" pitchFamily="2" charset="0"/>
+              </a:rPr>
+              <a:t>torch</a:t>
+            </a:r>
+            <a:r>
+              <a:rPr lang="zh-CN" altLang="en-US" sz="1400" b="1" dirty="0">
+                <a:latin typeface="Cambria Math" panose="02040503050406030204" pitchFamily="18" charset="0"/>
+                <a:ea typeface="等线" panose="02010600030101010101" pitchFamily="2" charset="-122"/>
+                <a:cs typeface="ZWAdobeF" pitchFamily="2" charset="0"/>
+              </a:rPr>
+              <a:t>转换为</a:t>
+            </a:r>
+            <a:r>
+              <a:rPr lang="en-US" altLang="zh-CN" sz="1400" b="1" dirty="0" err="1">
+                <a:latin typeface="Cambria Math" panose="02040503050406030204" pitchFamily="18" charset="0"/>
+                <a:ea typeface="等线" panose="02010600030101010101" pitchFamily="2" charset="-122"/>
+                <a:cs typeface="ZWAdobeF" pitchFamily="2" charset="0"/>
+              </a:rPr>
+              <a:t>onnx</a:t>
+            </a:r>
+            <a:r>
+              <a:rPr lang="zh-CN" altLang="en-US" sz="1400" b="1">
+                <a:latin typeface="Cambria Math" panose="02040503050406030204" pitchFamily="18" charset="0"/>
+                <a:ea typeface="等线" panose="02010600030101010101" pitchFamily="2" charset="-122"/>
+                <a:cs typeface="ZWAdobeF" pitchFamily="2" charset="0"/>
+              </a:rPr>
+              <a:t>；好像是不行</a:t>
+            </a:r>
+            <a:endParaRPr lang="en-US" altLang="zh-CN" sz="1400" b="1" dirty="0">
               <a:latin typeface="Cambria Math" panose="02040503050406030204" pitchFamily="18" charset="0"/>
               <a:ea typeface="等线" panose="02010600030101010101" pitchFamily="2" charset="-122"/>
               <a:cs typeface="ZWAdobeF" pitchFamily="2" charset="0"/>

</xml_diff>